<commit_message>
Sections 2.1 and 2.2
</commit_message>
<xml_diff>
--- a/Colour scheme.pptx
+++ b/Colour scheme.pptx
@@ -115,13 +115,93 @@
 <file path=ppt/revisionInfo.xml><?xml version="1.0" encoding="utf-8"?>
 <p1510:revInfo xmlns:a="http://schemas.openxmlformats.org/drawingml/2006/main" xmlns:r="http://schemas.openxmlformats.org/officeDocument/2006/relationships" xmlns:p1510="http://schemas.microsoft.com/office/powerpoint/2015/10/main">
   <p1510:revLst>
-    <p1510:client id="{282E5376-042D-401C-8A19-7A836F038AD9}" v="12" dt="2025-04-04T12:23:20.860"/>
+    <p1510:client id="{CDD1FFFE-251E-4104-ABBB-B35B128857F2}" v="2" dt="2025-04-10T12:49:06.821"/>
   </p1510:revLst>
 </p1510:revInfo>
 </file>
 
 <file path=ppt/changesInfos/changesInfo1.xml><?xml version="1.0" encoding="utf-8"?>
 <pc:chgInfo xmlns:a="http://schemas.openxmlformats.org/drawingml/2006/main" xmlns:r="http://schemas.openxmlformats.org/officeDocument/2006/relationships" xmlns:ac="http://schemas.microsoft.com/office/drawing/2013/main/command" xmlns:pc="http://schemas.microsoft.com/office/powerpoint/2013/main/command">
+  <pc:docChgLst>
+    <pc:chgData name="Lubbe, S [slubbe@sun.ac.za]" userId="656cc105-77ab-4b7b-bc17-2448ac205142" providerId="ADAL" clId="{CDD1FFFE-251E-4104-ABBB-B35B128857F2}"/>
+    <pc:docChg chg="modSld">
+      <pc:chgData name="Lubbe, S [slubbe@sun.ac.za]" userId="656cc105-77ab-4b7b-bc17-2448ac205142" providerId="ADAL" clId="{CDD1FFFE-251E-4104-ABBB-B35B128857F2}" dt="2025-04-10T12:50:02.491" v="26" actId="20577"/>
+      <pc:docMkLst>
+        <pc:docMk/>
+      </pc:docMkLst>
+      <pc:sldChg chg="addSp modSp mod">
+        <pc:chgData name="Lubbe, S [slubbe@sun.ac.za]" userId="656cc105-77ab-4b7b-bc17-2448ac205142" providerId="ADAL" clId="{CDD1FFFE-251E-4104-ABBB-B35B128857F2}" dt="2025-04-10T12:50:02.491" v="26" actId="20577"/>
+        <pc:sldMkLst>
+          <pc:docMk/>
+          <pc:sldMk cId="3887114811" sldId="256"/>
+        </pc:sldMkLst>
+        <pc:spChg chg="mod">
+          <ac:chgData name="Lubbe, S [slubbe@sun.ac.za]" userId="656cc105-77ab-4b7b-bc17-2448ac205142" providerId="ADAL" clId="{CDD1FFFE-251E-4104-ABBB-B35B128857F2}" dt="2025-04-10T12:46:24.665" v="0" actId="207"/>
+          <ac:spMkLst>
+            <pc:docMk/>
+            <pc:sldMk cId="3887114811" sldId="256"/>
+            <ac:spMk id="15" creationId="{6C9D4CFF-BB75-9B45-36D2-2D217C58C581}"/>
+          </ac:spMkLst>
+        </pc:spChg>
+        <pc:spChg chg="mod">
+          <ac:chgData name="Lubbe, S [slubbe@sun.ac.za]" userId="656cc105-77ab-4b7b-bc17-2448ac205142" providerId="ADAL" clId="{CDD1FFFE-251E-4104-ABBB-B35B128857F2}" dt="2025-04-10T12:47:13.541" v="6" actId="20577"/>
+          <ac:spMkLst>
+            <pc:docMk/>
+            <pc:sldMk cId="3887114811" sldId="256"/>
+            <ac:spMk id="16" creationId="{1F6799A4-3A92-141C-6538-E87D7D501D08}"/>
+          </ac:spMkLst>
+        </pc:spChg>
+        <pc:spChg chg="mod">
+          <ac:chgData name="Lubbe, S [slubbe@sun.ac.za]" userId="656cc105-77ab-4b7b-bc17-2448ac205142" providerId="ADAL" clId="{CDD1FFFE-251E-4104-ABBB-B35B128857F2}" dt="2025-04-10T12:48:57.075" v="11" actId="207"/>
+          <ac:spMkLst>
+            <pc:docMk/>
+            <pc:sldMk cId="3887114811" sldId="256"/>
+            <ac:spMk id="24" creationId="{2E750998-FB4E-3CC2-6B99-A630E3551628}"/>
+          </ac:spMkLst>
+        </pc:spChg>
+        <pc:spChg chg="mod">
+          <ac:chgData name="Lubbe, S [slubbe@sun.ac.za]" userId="656cc105-77ab-4b7b-bc17-2448ac205142" providerId="ADAL" clId="{CDD1FFFE-251E-4104-ABBB-B35B128857F2}" dt="2025-04-10T12:49:04.011" v="17" actId="20577"/>
+          <ac:spMkLst>
+            <pc:docMk/>
+            <pc:sldMk cId="3887114811" sldId="256"/>
+            <ac:spMk id="25" creationId="{2D0CFCD9-EF7D-3DFD-DBE3-0BD5F7369820}"/>
+          </ac:spMkLst>
+        </pc:spChg>
+        <pc:spChg chg="mod">
+          <ac:chgData name="Lubbe, S [slubbe@sun.ac.za]" userId="656cc105-77ab-4b7b-bc17-2448ac205142" providerId="ADAL" clId="{CDD1FFFE-251E-4104-ABBB-B35B128857F2}" dt="2025-04-10T12:49:50.007" v="20" actId="207"/>
+          <ac:spMkLst>
+            <pc:docMk/>
+            <pc:sldMk cId="3887114811" sldId="256"/>
+            <ac:spMk id="27" creationId="{89E223E4-BD14-FE80-4EEA-EDD9A8527ADC}"/>
+          </ac:spMkLst>
+        </pc:spChg>
+        <pc:spChg chg="mod">
+          <ac:chgData name="Lubbe, S [slubbe@sun.ac.za]" userId="656cc105-77ab-4b7b-bc17-2448ac205142" providerId="ADAL" clId="{CDD1FFFE-251E-4104-ABBB-B35B128857F2}" dt="2025-04-10T12:50:02.491" v="26" actId="20577"/>
+          <ac:spMkLst>
+            <pc:docMk/>
+            <pc:sldMk cId="3887114811" sldId="256"/>
+            <ac:spMk id="28" creationId="{5BCBB668-DED8-EB85-71EF-CA6ECC20C598}"/>
+          </ac:spMkLst>
+        </pc:spChg>
+        <pc:grpChg chg="add mod">
+          <ac:chgData name="Lubbe, S [slubbe@sun.ac.za]" userId="656cc105-77ab-4b7b-bc17-2448ac205142" providerId="ADAL" clId="{CDD1FFFE-251E-4104-ABBB-B35B128857F2}" dt="2025-04-10T12:47:23.854" v="8" actId="1076"/>
+          <ac:grpSpMkLst>
+            <pc:docMk/>
+            <pc:sldMk cId="3887114811" sldId="256"/>
+            <ac:grpSpMk id="23" creationId="{916F47DA-49A6-6516-E87F-132268DF319E}"/>
+          </ac:grpSpMkLst>
+        </pc:grpChg>
+        <pc:grpChg chg="add mod">
+          <ac:chgData name="Lubbe, S [slubbe@sun.ac.za]" userId="656cc105-77ab-4b7b-bc17-2448ac205142" providerId="ADAL" clId="{CDD1FFFE-251E-4104-ABBB-B35B128857F2}" dt="2025-04-10T12:49:11.027" v="19" actId="1076"/>
+          <ac:grpSpMkLst>
+            <pc:docMk/>
+            <pc:sldMk cId="3887114811" sldId="256"/>
+            <ac:grpSpMk id="26" creationId="{41C7EC6B-F4EE-9470-E0F7-A78CCAFC2B58}"/>
+          </ac:grpSpMkLst>
+        </pc:grpChg>
+      </pc:sldChg>
+    </pc:docChg>
+  </pc:docChgLst>
   <pc:docChgLst>
     <pc:chgData name="Lubbe, S [slubbe@sun.ac.za]" userId="656cc105-77ab-4b7b-bc17-2448ac205142" providerId="ADAL" clId="{282E5376-042D-401C-8A19-7A836F038AD9}"/>
     <pc:docChg chg="custSel addSld delSld modSld">
@@ -310,14 +390,6 @@
           <pc:docMk/>
           <pc:sldMk cId="1604129734" sldId="257"/>
         </pc:sldMkLst>
-        <pc:picChg chg="add mod">
-          <ac:chgData name="Lubbe, S [slubbe@sun.ac.za]" userId="656cc105-77ab-4b7b-bc17-2448ac205142" providerId="ADAL" clId="{282E5376-042D-401C-8A19-7A836F038AD9}" dt="2025-04-04T12:23:33.539" v="58" actId="14100"/>
-          <ac:picMkLst>
-            <pc:docMk/>
-            <pc:sldMk cId="1604129734" sldId="257"/>
-            <ac:picMk id="2" creationId="{D0945169-B567-0695-920A-92FC4BB40F40}"/>
-          </ac:picMkLst>
-        </pc:picChg>
       </pc:sldChg>
     </pc:docChg>
   </pc:docChgLst>
@@ -473,7 +545,7 @@
           <a:p>
             <a:fld id="{53B1ADF3-3DB3-4D55-A024-7ADC81A38BCD}" type="datetimeFigureOut">
               <a:rPr lang="en-ZA" smtClean="0"/>
-              <a:t>2025/04/03</a:t>
+              <a:t>2025/04/10</a:t>
             </a:fld>
             <a:endParaRPr lang="en-ZA"/>
           </a:p>
@@ -673,7 +745,7 @@
           <a:p>
             <a:fld id="{53B1ADF3-3DB3-4D55-A024-7ADC81A38BCD}" type="datetimeFigureOut">
               <a:rPr lang="en-ZA" smtClean="0"/>
-              <a:t>2025/04/03</a:t>
+              <a:t>2025/04/10</a:t>
             </a:fld>
             <a:endParaRPr lang="en-ZA"/>
           </a:p>
@@ -883,7 +955,7 @@
           <a:p>
             <a:fld id="{53B1ADF3-3DB3-4D55-A024-7ADC81A38BCD}" type="datetimeFigureOut">
               <a:rPr lang="en-ZA" smtClean="0"/>
-              <a:t>2025/04/03</a:t>
+              <a:t>2025/04/10</a:t>
             </a:fld>
             <a:endParaRPr lang="en-ZA"/>
           </a:p>
@@ -1083,7 +1155,7 @@
           <a:p>
             <a:fld id="{53B1ADF3-3DB3-4D55-A024-7ADC81A38BCD}" type="datetimeFigureOut">
               <a:rPr lang="en-ZA" smtClean="0"/>
-              <a:t>2025/04/03</a:t>
+              <a:t>2025/04/10</a:t>
             </a:fld>
             <a:endParaRPr lang="en-ZA"/>
           </a:p>
@@ -1359,7 +1431,7 @@
           <a:p>
             <a:fld id="{53B1ADF3-3DB3-4D55-A024-7ADC81A38BCD}" type="datetimeFigureOut">
               <a:rPr lang="en-ZA" smtClean="0"/>
-              <a:t>2025/04/03</a:t>
+              <a:t>2025/04/10</a:t>
             </a:fld>
             <a:endParaRPr lang="en-ZA"/>
           </a:p>
@@ -1627,7 +1699,7 @@
           <a:p>
             <a:fld id="{53B1ADF3-3DB3-4D55-A024-7ADC81A38BCD}" type="datetimeFigureOut">
               <a:rPr lang="en-ZA" smtClean="0"/>
-              <a:t>2025/04/03</a:t>
+              <a:t>2025/04/10</a:t>
             </a:fld>
             <a:endParaRPr lang="en-ZA"/>
           </a:p>
@@ -2042,7 +2114,7 @@
           <a:p>
             <a:fld id="{53B1ADF3-3DB3-4D55-A024-7ADC81A38BCD}" type="datetimeFigureOut">
               <a:rPr lang="en-ZA" smtClean="0"/>
-              <a:t>2025/04/03</a:t>
+              <a:t>2025/04/10</a:t>
             </a:fld>
             <a:endParaRPr lang="en-ZA"/>
           </a:p>
@@ -2184,7 +2256,7 @@
           <a:p>
             <a:fld id="{53B1ADF3-3DB3-4D55-A024-7ADC81A38BCD}" type="datetimeFigureOut">
               <a:rPr lang="en-ZA" smtClean="0"/>
-              <a:t>2025/04/03</a:t>
+              <a:t>2025/04/10</a:t>
             </a:fld>
             <a:endParaRPr lang="en-ZA"/>
           </a:p>
@@ -2297,7 +2369,7 @@
           <a:p>
             <a:fld id="{53B1ADF3-3DB3-4D55-A024-7ADC81A38BCD}" type="datetimeFigureOut">
               <a:rPr lang="en-ZA" smtClean="0"/>
-              <a:t>2025/04/03</a:t>
+              <a:t>2025/04/10</a:t>
             </a:fld>
             <a:endParaRPr lang="en-ZA"/>
           </a:p>
@@ -2610,7 +2682,7 @@
           <a:p>
             <a:fld id="{53B1ADF3-3DB3-4D55-A024-7ADC81A38BCD}" type="datetimeFigureOut">
               <a:rPr lang="en-ZA" smtClean="0"/>
-              <a:t>2025/04/03</a:t>
+              <a:t>2025/04/10</a:t>
             </a:fld>
             <a:endParaRPr lang="en-ZA"/>
           </a:p>
@@ -2899,7 +2971,7 @@
           <a:p>
             <a:fld id="{53B1ADF3-3DB3-4D55-A024-7ADC81A38BCD}" type="datetimeFigureOut">
               <a:rPr lang="en-ZA" smtClean="0"/>
-              <a:t>2025/04/03</a:t>
+              <a:t>2025/04/10</a:t>
             </a:fld>
             <a:endParaRPr lang="en-ZA"/>
           </a:p>
@@ -3142,7 +3214,7 @@
           <a:p>
             <a:fld id="{53B1ADF3-3DB3-4D55-A024-7ADC81A38BCD}" type="datetimeFigureOut">
               <a:rPr lang="en-ZA" smtClean="0"/>
-              <a:t>2025/04/03</a:t>
+              <a:t>2025/04/10</a:t>
             </a:fld>
             <a:endParaRPr lang="en-ZA"/>
           </a:p>
@@ -4153,7 +4225,7 @@
               <a:avLst/>
             </a:prstGeom>
             <a:solidFill>
-              <a:srgbClr val="FFCC99"/>
+              <a:srgbClr val="FAE486"/>
             </a:solidFill>
             <a:ln>
               <a:noFill/>
@@ -4215,7 +4287,7 @@
               <a:pPr algn="ctr"/>
               <a:r>
                 <a:rPr lang="en-GB" dirty="0"/>
-                <a:t>FFCC99</a:t>
+                <a:t>FAE486</a:t>
               </a:r>
             </a:p>
           </p:txBody>
@@ -4325,6 +4397,224 @@
               <a:r>
                 <a:rPr lang="en-GB" dirty="0"/>
                 <a:t>FFB3B3</a:t>
+              </a:r>
+            </a:p>
+          </p:txBody>
+        </p:sp>
+      </p:grpSp>
+      <p:grpSp>
+        <p:nvGrpSpPr>
+          <p:cNvPr id="23" name="Group 22">
+            <a:extLst>
+              <a:ext uri="{FF2B5EF4-FFF2-40B4-BE49-F238E27FC236}">
+                <a16:creationId xmlns:a16="http://schemas.microsoft.com/office/drawing/2014/main" id="{916F47DA-49A6-6516-E87F-132268DF319E}"/>
+              </a:ext>
+            </a:extLst>
+          </p:cNvPr>
+          <p:cNvGrpSpPr/>
+          <p:nvPr/>
+        </p:nvGrpSpPr>
+        <p:grpSpPr>
+          <a:xfrm>
+            <a:off x="7992535" y="3024108"/>
+            <a:ext cx="1148080" cy="1395492"/>
+            <a:chOff x="7918028" y="839708"/>
+            <a:chExt cx="1148080" cy="1395492"/>
+          </a:xfrm>
+        </p:grpSpPr>
+        <p:sp>
+          <p:nvSpPr>
+            <p:cNvPr id="24" name="Rectangle: Rounded Corners 23">
+              <a:extLst>
+                <a:ext uri="{FF2B5EF4-FFF2-40B4-BE49-F238E27FC236}">
+                  <a16:creationId xmlns:a16="http://schemas.microsoft.com/office/drawing/2014/main" id="{2E750998-FB4E-3CC2-6B99-A630E3551628}"/>
+                </a:ext>
+              </a:extLst>
+            </p:cNvPr>
+            <p:cNvSpPr/>
+            <p:nvPr/>
+          </p:nvSpPr>
+          <p:spPr>
+            <a:xfrm>
+              <a:off x="8131389" y="839708"/>
+              <a:ext cx="721360" cy="721360"/>
+            </a:xfrm>
+            <a:prstGeom prst="roundRect">
+              <a:avLst/>
+            </a:prstGeom>
+            <a:solidFill>
+              <a:srgbClr val="F7CE21"/>
+            </a:solidFill>
+            <a:ln>
+              <a:noFill/>
+            </a:ln>
+          </p:spPr>
+          <p:style>
+            <a:lnRef idx="2">
+              <a:schemeClr val="accent1">
+                <a:shade val="15000"/>
+              </a:schemeClr>
+            </a:lnRef>
+            <a:fillRef idx="1">
+              <a:schemeClr val="accent1"/>
+            </a:fillRef>
+            <a:effectRef idx="0">
+              <a:schemeClr val="accent1"/>
+            </a:effectRef>
+            <a:fontRef idx="minor">
+              <a:schemeClr val="lt1"/>
+            </a:fontRef>
+          </p:style>
+          <p:txBody>
+            <a:bodyPr rtlCol="0" anchor="ctr"/>
+            <a:lstStyle/>
+            <a:p>
+              <a:pPr algn="ctr"/>
+              <a:endParaRPr lang="en-ZA" dirty="0"/>
+            </a:p>
+          </p:txBody>
+        </p:sp>
+        <p:sp>
+          <p:nvSpPr>
+            <p:cNvPr id="25" name="TextBox 24">
+              <a:extLst>
+                <a:ext uri="{FF2B5EF4-FFF2-40B4-BE49-F238E27FC236}">
+                  <a16:creationId xmlns:a16="http://schemas.microsoft.com/office/drawing/2014/main" id="{2D0CFCD9-EF7D-3DFD-DBE3-0BD5F7369820}"/>
+                </a:ext>
+              </a:extLst>
+            </p:cNvPr>
+            <p:cNvSpPr txBox="1"/>
+            <p:nvPr/>
+          </p:nvSpPr>
+          <p:spPr>
+            <a:xfrm>
+              <a:off x="7918028" y="1865868"/>
+              <a:ext cx="1148080" cy="369332"/>
+            </a:xfrm>
+            <a:prstGeom prst="rect">
+              <a:avLst/>
+            </a:prstGeom>
+            <a:noFill/>
+          </p:spPr>
+          <p:txBody>
+            <a:bodyPr wrap="square" rtlCol="0">
+              <a:spAutoFit/>
+            </a:bodyPr>
+            <a:lstStyle/>
+            <a:p>
+              <a:pPr algn="ctr"/>
+              <a:r>
+                <a:rPr lang="en-GB" dirty="0"/>
+                <a:t>F7CE21</a:t>
+              </a:r>
+            </a:p>
+          </p:txBody>
+        </p:sp>
+      </p:grpSp>
+      <p:grpSp>
+        <p:nvGrpSpPr>
+          <p:cNvPr id="26" name="Group 25">
+            <a:extLst>
+              <a:ext uri="{FF2B5EF4-FFF2-40B4-BE49-F238E27FC236}">
+                <a16:creationId xmlns:a16="http://schemas.microsoft.com/office/drawing/2014/main" id="{41C7EC6B-F4EE-9470-E0F7-A78CCAFC2B58}"/>
+              </a:ext>
+            </a:extLst>
+          </p:cNvPr>
+          <p:cNvGrpSpPr/>
+          <p:nvPr/>
+        </p:nvGrpSpPr>
+        <p:grpSpPr>
+          <a:xfrm>
+            <a:off x="5161281" y="3024108"/>
+            <a:ext cx="1148080" cy="1395492"/>
+            <a:chOff x="4744719" y="833120"/>
+            <a:chExt cx="1148080" cy="1395492"/>
+          </a:xfrm>
+        </p:grpSpPr>
+        <p:sp>
+          <p:nvSpPr>
+            <p:cNvPr id="27" name="Rectangle: Rounded Corners 26">
+              <a:extLst>
+                <a:ext uri="{FF2B5EF4-FFF2-40B4-BE49-F238E27FC236}">
+                  <a16:creationId xmlns:a16="http://schemas.microsoft.com/office/drawing/2014/main" id="{89E223E4-BD14-FE80-4EEA-EDD9A8527ADC}"/>
+                </a:ext>
+              </a:extLst>
+            </p:cNvPr>
+            <p:cNvSpPr/>
+            <p:nvPr/>
+          </p:nvSpPr>
+          <p:spPr>
+            <a:xfrm>
+              <a:off x="4958080" y="833120"/>
+              <a:ext cx="721360" cy="721360"/>
+            </a:xfrm>
+            <a:prstGeom prst="roundRect">
+              <a:avLst/>
+            </a:prstGeom>
+            <a:solidFill>
+              <a:srgbClr val="89C4FF"/>
+            </a:solidFill>
+            <a:ln>
+              <a:noFill/>
+            </a:ln>
+          </p:spPr>
+          <p:style>
+            <a:lnRef idx="2">
+              <a:schemeClr val="accent1">
+                <a:shade val="15000"/>
+              </a:schemeClr>
+            </a:lnRef>
+            <a:fillRef idx="1">
+              <a:schemeClr val="accent1"/>
+            </a:fillRef>
+            <a:effectRef idx="0">
+              <a:schemeClr val="accent1"/>
+            </a:effectRef>
+            <a:fontRef idx="minor">
+              <a:schemeClr val="lt1"/>
+            </a:fontRef>
+          </p:style>
+          <p:txBody>
+            <a:bodyPr rtlCol="0" anchor="ctr"/>
+            <a:lstStyle/>
+            <a:p>
+              <a:pPr algn="ctr"/>
+              <a:endParaRPr lang="en-ZA" dirty="0"/>
+            </a:p>
+          </p:txBody>
+        </p:sp>
+        <p:sp>
+          <p:nvSpPr>
+            <p:cNvPr id="28" name="TextBox 27">
+              <a:extLst>
+                <a:ext uri="{FF2B5EF4-FFF2-40B4-BE49-F238E27FC236}">
+                  <a16:creationId xmlns:a16="http://schemas.microsoft.com/office/drawing/2014/main" id="{5BCBB668-DED8-EB85-71EF-CA6ECC20C598}"/>
+                </a:ext>
+              </a:extLst>
+            </p:cNvPr>
+            <p:cNvSpPr txBox="1"/>
+            <p:nvPr/>
+          </p:nvSpPr>
+          <p:spPr>
+            <a:xfrm>
+              <a:off x="4744719" y="1859280"/>
+              <a:ext cx="1148080" cy="369332"/>
+            </a:xfrm>
+            <a:prstGeom prst="rect">
+              <a:avLst/>
+            </a:prstGeom>
+            <a:noFill/>
+          </p:spPr>
+          <p:txBody>
+            <a:bodyPr wrap="square" rtlCol="0">
+              <a:spAutoFit/>
+            </a:bodyPr>
+            <a:lstStyle/>
+            <a:p>
+              <a:pPr algn="ctr"/>
+              <a:r>
+                <a:rPr lang="en-GB" dirty="0"/>
+                <a:t>89C4FF</a:t>
               </a:r>
             </a:p>
           </p:txBody>

</xml_diff>